<commit_message>
removed Mobi specific url's and links, fixes issue nr. 2
</commit_message>
<xml_diff>
--- a/content/feature-presentation/AMW_Features.pptx
+++ b/content/feature-presentation/AMW_Features.pptx
@@ -319,7 +319,7 @@
             <a:fld id="{7DE900A2-000E-4383-8E23-D8A2C4467820}" type="datetimeFigureOut">
               <a:rPr lang="de-CH" sz="1000" smtClean="0"/>
               <a:pPr/>
-              <a:t>28.09.2016</a:t>
+              <a:t>21.12.2016</a:t>
             </a:fld>
             <a:endParaRPr lang="de-CH" sz="1000"/>
           </a:p>
@@ -455,7 +455,7 @@
             <a:fld id="{062BFB36-BFD1-4F42-867B-0B14C7589D54}" type="datetimeFigureOut">
               <a:rPr lang="de-CH" smtClean="0"/>
               <a:pPr/>
-              <a:t>28.09.2016</a:t>
+              <a:t>21.12.2016</a:t>
             </a:fld>
             <a:endParaRPr lang="de-CH"/>
           </a:p>
@@ -1950,7 +1950,7 @@
           <a:p>
             <a:fld id="{0E106A65-AA2A-4638-8A93-2EADC4C99059}" type="datetimeFigureOut">
               <a:rPr lang="de-CH" smtClean="0"/>
-              <a:t>28.09.2016</a:t>
+              <a:t>21.12.2016</a:t>
             </a:fld>
             <a:endParaRPr lang="de-CH"/>
           </a:p>
@@ -2514,7 +2514,7 @@
           <a:p>
             <a:fld id="{0E106A65-AA2A-4638-8A93-2EADC4C99059}" type="datetimeFigureOut">
               <a:rPr lang="de-CH" smtClean="0"/>
-              <a:t>28.09.2016</a:t>
+              <a:t>21.12.2016</a:t>
             </a:fld>
             <a:endParaRPr lang="de-CH"/>
           </a:p>
@@ -10176,7 +10176,15 @@
             </a:pPr>
             <a:r>
               <a:rPr lang="de-CH" dirty="0" smtClean="0"/>
-              <a:t>Im AMW GUI als eine Element sichtbar</a:t>
+              <a:t>Im AMW GUI als </a:t>
+            </a:r>
+            <a:r>
+              <a:rPr lang="de-CH" dirty="0" smtClean="0"/>
+              <a:t>ein </a:t>
+            </a:r>
+            <a:r>
+              <a:rPr lang="de-CH" dirty="0" smtClean="0"/>
+              <a:t>Element sichtbar</a:t>
             </a:r>
           </a:p>
           <a:p>
@@ -10242,7 +10250,11 @@
             </a:pPr>
             <a:r>
               <a:rPr lang="de-CH" dirty="0" smtClean="0"/>
-              <a:t>Entspricht in etwa einer </a:t>
+              <a:t>Entspricht in etwa </a:t>
+            </a:r>
+            <a:r>
+              <a:rPr lang="de-CH" dirty="0" smtClean="0"/>
+              <a:t>einem </a:t>
             </a:r>
             <a:r>
               <a:rPr lang="de-CH" dirty="0" err="1" smtClean="0"/>
@@ -11313,8 +11325,12 @@
               <a:t>Unterstützt </a:t>
             </a:r>
             <a:r>
+              <a:rPr lang="de-CH" dirty="0" err="1"/>
+              <a:t>M</a:t>
+            </a:r>
+            <a:r>
               <a:rPr lang="de-CH" dirty="0" err="1" smtClean="0"/>
-              <a:t>merging</a:t>
+              <a:t>erging</a:t>
             </a:r>
             <a:endParaRPr lang="de-CH" dirty="0" smtClean="0"/>
           </a:p>
@@ -13302,14 +13318,21 @@
         <p:spPr/>
         <p:txBody>
           <a:bodyPr>
-            <a:normAutofit fontScale="92500" lnSpcReduction="10000"/>
+            <a:normAutofit/>
           </a:bodyPr>
           <a:lstStyle/>
           <a:p>
             <a:r>
               <a:rPr lang="de-CH" dirty="0" smtClean="0"/>
-              <a:t>Testet die Ressourcen, die der Applikation angehängt sind</a:t>
-            </a:r>
+              <a:t>Testet die Ressourcen, die der Applikation angehängt </a:t>
+            </a:r>
+            <a:r>
+              <a:rPr lang="de-CH" dirty="0" smtClean="0"/>
+              <a:t>sind</a:t>
+            </a:r>
+          </a:p>
+          <a:p>
+            <a:endParaRPr lang="de-CH" dirty="0" smtClean="0"/>
           </a:p>
           <a:p>
             <a:r>
@@ -13373,25 +13396,7 @@
               <a:rPr lang="de-CH" dirty="0" smtClean="0"/>
               <a:t>DB2</a:t>
             </a:r>
-          </a:p>
-          <a:p>
             <a:endParaRPr lang="de-CH" dirty="0" smtClean="0"/>
-          </a:p>
-          <a:p>
-            <a:r>
-              <a:rPr lang="de-CH" dirty="0" smtClean="0"/>
-              <a:t>Wiki: </a:t>
-            </a:r>
-          </a:p>
-          <a:p>
-            <a:pPr>
-              <a:buNone/>
-            </a:pPr>
-            <a:r>
-              <a:rPr lang="de-CH" dirty="0" smtClean="0"/>
-              <a:t>https://mobiwiki.mobicorp.ch/wiki/index.php?title=AMW_Infrastruktur_Shakedown_Test</a:t>
-            </a:r>
-            <a:endParaRPr lang="de-CH" sz="2000" dirty="0" smtClean="0"/>
           </a:p>
         </p:txBody>
       </p:sp>
@@ -15852,8 +15857,8 @@
               <a:t>Relations: Verknüpfung zu anderen Ressourcen für </a:t>
             </a:r>
             <a:r>
-              <a:rPr lang="de-CH" dirty="0" err="1" smtClean="0"/>
-              <a:t>reuse</a:t>
+              <a:rPr lang="de-CH" dirty="0" smtClean="0"/>
+              <a:t>Reuse</a:t>
             </a:r>
             <a:endParaRPr lang="de-CH" dirty="0"/>
           </a:p>
@@ -16946,8 +16951,8 @@
         </p:nvSpPr>
         <p:spPr>
           <a:xfrm>
-            <a:off x="6609184" y="3088705"/>
-            <a:ext cx="300082" cy="369332"/>
+            <a:off x="6609184" y="3275692"/>
+            <a:ext cx="641971" cy="369332"/>
           </a:xfrm>
           <a:prstGeom prst="rect">
             <a:avLst/>
@@ -16962,7 +16967,7 @@
           <a:p>
             <a:r>
               <a:rPr lang="de-CH" dirty="0" smtClean="0"/>
-              <a:t>x</a:t>
+              <a:t>dev3</a:t>
             </a:r>
             <a:endParaRPr lang="de-CH" dirty="0"/>
           </a:p>
@@ -16970,14 +16975,14 @@
       </p:sp>
       <p:sp>
         <p:nvSpPr>
-          <p:cNvPr id="25" name="Textfeld 24"/>
+          <p:cNvPr id="26" name="Textfeld 25"/>
           <p:cNvSpPr txBox="1"/>
           <p:nvPr/>
         </p:nvSpPr>
         <p:spPr>
           <a:xfrm>
-            <a:off x="6609184" y="3376737"/>
-            <a:ext cx="300082" cy="369332"/>
+            <a:off x="6609184" y="4384849"/>
+            <a:ext cx="551241" cy="369332"/>
           </a:xfrm>
           <a:prstGeom prst="rect">
             <a:avLst/>
@@ -16992,7 +16997,7 @@
           <a:p>
             <a:r>
               <a:rPr lang="de-CH" dirty="0" smtClean="0"/>
-              <a:t>y</a:t>
+              <a:t>int2</a:t>
             </a:r>
             <a:endParaRPr lang="de-CH" dirty="0"/>
           </a:p>
@@ -17000,14 +17005,14 @@
       </p:sp>
       <p:sp>
         <p:nvSpPr>
-          <p:cNvPr id="26" name="Textfeld 25"/>
+          <p:cNvPr id="27" name="Textfeld 26"/>
           <p:cNvSpPr txBox="1"/>
           <p:nvPr/>
         </p:nvSpPr>
         <p:spPr>
           <a:xfrm>
-            <a:off x="6609184" y="4384849"/>
-            <a:ext cx="248786" cy="369332"/>
+            <a:off x="6609184" y="4096817"/>
+            <a:ext cx="551241" cy="369332"/>
           </a:xfrm>
           <a:prstGeom prst="rect">
             <a:avLst/>
@@ -17022,7 +17027,7 @@
           <a:p>
             <a:r>
               <a:rPr lang="de-CH" dirty="0" smtClean="0"/>
-              <a:t>t</a:t>
+              <a:t>int1</a:t>
             </a:r>
             <a:endParaRPr lang="de-CH" dirty="0"/>
           </a:p>
@@ -17030,14 +17035,14 @@
       </p:sp>
       <p:sp>
         <p:nvSpPr>
-          <p:cNvPr id="27" name="Textfeld 26"/>
+          <p:cNvPr id="28" name="Textfeld 27"/>
           <p:cNvSpPr txBox="1"/>
           <p:nvPr/>
         </p:nvSpPr>
         <p:spPr>
           <a:xfrm>
-            <a:off x="6609184" y="4096817"/>
-            <a:ext cx="235962" cy="369332"/>
+            <a:off x="6609184" y="5176937"/>
+            <a:ext cx="743602" cy="369332"/>
           </a:xfrm>
           <a:prstGeom prst="rect">
             <a:avLst/>
@@ -17052,37 +17057,7 @@
           <a:p>
             <a:r>
               <a:rPr lang="de-CH" dirty="0" smtClean="0"/>
-              <a:t>i</a:t>
-            </a:r>
-            <a:endParaRPr lang="de-CH" dirty="0"/>
-          </a:p>
-        </p:txBody>
-      </p:sp>
-      <p:sp>
-        <p:nvSpPr>
-          <p:cNvPr id="28" name="Textfeld 27"/>
-          <p:cNvSpPr txBox="1"/>
-          <p:nvPr/>
-        </p:nvSpPr>
-        <p:spPr>
-          <a:xfrm>
-            <a:off x="6609184" y="5176937"/>
-            <a:ext cx="312906" cy="369332"/>
-          </a:xfrm>
-          <a:prstGeom prst="rect">
-            <a:avLst/>
-          </a:prstGeom>
-          <a:noFill/>
-        </p:spPr>
-        <p:txBody>
-          <a:bodyPr wrap="none" rtlCol="0">
-            <a:spAutoFit/>
-          </a:bodyPr>
-          <a:lstStyle/>
-          <a:p>
-            <a:r>
-              <a:rPr lang="de-CH" dirty="0" smtClean="0"/>
-              <a:t>p</a:t>
+              <a:t>prod1</a:t>
             </a:r>
             <a:endParaRPr lang="de-CH" dirty="0"/>
           </a:p>
@@ -17244,7 +17219,7 @@
         <p:spPr>
           <a:xfrm>
             <a:off x="6609184" y="2440633"/>
-            <a:ext cx="312906" cy="369332"/>
+            <a:ext cx="641971" cy="369332"/>
           </a:xfrm>
           <a:prstGeom prst="rect">
             <a:avLst/>
@@ -17259,7 +17234,7 @@
           <a:p>
             <a:r>
               <a:rPr lang="de-CH" dirty="0" smtClean="0"/>
-              <a:t>b</a:t>
+              <a:t>dev1</a:t>
             </a:r>
             <a:endParaRPr lang="de-CH" dirty="0"/>
           </a:p>
@@ -17273,8 +17248,8 @@
         </p:nvSpPr>
         <p:spPr>
           <a:xfrm>
-            <a:off x="6609184" y="2800673"/>
-            <a:ext cx="300082" cy="369332"/>
+            <a:off x="6609184" y="2843644"/>
+            <a:ext cx="641971" cy="369332"/>
           </a:xfrm>
           <a:prstGeom prst="rect">
             <a:avLst/>
@@ -17289,7 +17264,7 @@
           <a:p>
             <a:r>
               <a:rPr lang="de-CH" dirty="0" smtClean="0"/>
-              <a:t>c</a:t>
+              <a:t>dev2</a:t>
             </a:r>
             <a:endParaRPr lang="de-CH" dirty="0"/>
           </a:p>
@@ -17407,7 +17382,11 @@
           <a:p>
             <a:r>
               <a:rPr lang="de-CH" sz="1400" dirty="0" smtClean="0"/>
-              <a:t>addc01.umobi.mobicorp.test</a:t>
+              <a:t>amw</a:t>
+            </a:r>
+            <a:r>
+              <a:rPr lang="de-CH" sz="1400" dirty="0" smtClean="0"/>
+              <a:t>01.a-gogo.test</a:t>
             </a:r>
             <a:endParaRPr lang="de-CH" sz="1400" dirty="0"/>
           </a:p>
@@ -17437,7 +17416,7 @@
           <a:p>
             <a:r>
               <a:rPr lang="de-CH" sz="1400" dirty="0" smtClean="0"/>
-              <a:t>addc03.imobi.mobicorp.ch</a:t>
+              <a:t>amw02.a-gogo.ch</a:t>
             </a:r>
             <a:endParaRPr lang="de-CH" sz="1400" dirty="0"/>
           </a:p>
@@ -17467,7 +17446,7 @@
           <a:p>
             <a:r>
               <a:rPr lang="de-CH" sz="1400" dirty="0" smtClean="0"/>
-              <a:t>addc03.mobi.mobicorp.ch</a:t>
+              <a:t>amw03.a-gogo.ch</a:t>
             </a:r>
             <a:endParaRPr lang="de-CH" sz="1400" dirty="0"/>
           </a:p>

</xml_diff>